<commit_message>
Fixes typo in IDE cheatsheet
</commit_message>
<xml_diff>
--- a/powerpoints/rstudio-ide.pptx
+++ b/powerpoints/rstudio-ide.pptx
@@ -8778,7 +8778,7 @@
         </p:sp>
         <p:sp>
           <p:nvSpPr>
-            <p:cNvPr id="231" name="Open with debug(), browse(), or a breakpoint. RStudio will open the debugger mode when it encounters a breakpoint while executing code."/>
+            <p:cNvPr id="231" name="Open with debug(), browser(), or a breakpoint. RStudio will open the debugger mode when it encounters a breakpoint while executing code."/>
             <p:cNvSpPr txBox="1"/>
             <p:nvPr/>
           </p:nvSpPr>
@@ -8854,7 +8854,7 @@
                   <a:cs typeface="+mn-cs"/>
                   <a:sym typeface="Source Sans Pro"/>
                 </a:rPr>
-                <a:t>browse(), </a:t>
+                <a:t>browser(), </a:t>
               </a:r>
               <a:r>
                 <a:t>or a breakpoint. RStudio will open the debugger mode when it encounters a breakpoint while executing code.</a:t>

</xml_diff>